<commit_message>
Update ppt 62 scale to 16:9
</commit_message>
<xml_diff>
--- a/62神是保障.pptx
+++ b/62神是保障.pptx
@@ -7,12 +7,13 @@
   <p:sldIdLst>
     <p:sldId id="256" r:id="rId2"/>
     <p:sldId id="257" r:id="rId3"/>
-    <p:sldId id="258" r:id="rId4"/>
-    <p:sldId id="259" r:id="rId5"/>
-    <p:sldId id="260" r:id="rId6"/>
-    <p:sldId id="261" r:id="rId7"/>
+    <p:sldId id="262" r:id="rId4"/>
+    <p:sldId id="258" r:id="rId5"/>
+    <p:sldId id="259" r:id="rId6"/>
+    <p:sldId id="260" r:id="rId7"/>
+    <p:sldId id="261" r:id="rId8"/>
   </p:sldIdLst>
-  <p:sldSz cx="9144000" cy="6858000" type="screen4x3"/>
+  <p:sldSz cx="9144000" cy="5143500" type="screen16x9"/>
   <p:notesSz cx="6858000" cy="9144000"/>
   <p:defaultTextStyle>
     <a:defPPr>
@@ -146,8 +147,8 @@
         </p:nvSpPr>
         <p:spPr>
           <a:xfrm>
-            <a:off x="2286000" y="3124200"/>
-            <a:ext cx="6172200" cy="1894362"/>
+            <a:off x="2286000" y="2343150"/>
+            <a:ext cx="6172200" cy="1420772"/>
           </a:xfrm>
         </p:spPr>
         <p:txBody>
@@ -178,8 +179,8 @@
         </p:nvSpPr>
         <p:spPr>
           <a:xfrm>
-            <a:off x="2286000" y="5003322"/>
-            <a:ext cx="6172200" cy="1371600"/>
+            <a:off x="2286000" y="3752492"/>
+            <a:ext cx="6172200" cy="1028700"/>
           </a:xfrm>
         </p:spPr>
         <p:txBody>
@@ -239,8 +240,8 @@
         </p:nvSpPr>
         <p:spPr bwMode="auto">
           <a:xfrm rot="5400000">
-            <a:off x="7764621" y="1174097"/>
-            <a:ext cx="2286000" cy="381000"/>
+            <a:off x="8050371" y="832948"/>
+            <a:ext cx="1714500" cy="381000"/>
           </a:xfrm>
         </p:spPr>
         <p:txBody>
@@ -250,7 +251,7 @@
             <a:fld id="{86B5546F-C09B-4E63-ABC5-F7C86A7E8D66}" type="datetimeFigureOut">
               <a:rPr lang="en-US" smtClean="0"/>
               <a:pPr/>
-              <a:t>6/9/2019</a:t>
+              <a:t>8/17/2019</a:t>
             </a:fld>
             <a:endParaRPr lang="en-US"/>
           </a:p>
@@ -268,8 +269,8 @@
         </p:nvSpPr>
         <p:spPr bwMode="auto">
           <a:xfrm rot="5400000">
-            <a:off x="7077269" y="4181669"/>
-            <a:ext cx="3657600" cy="384048"/>
+            <a:off x="7534469" y="3088246"/>
+            <a:ext cx="2743200" cy="384048"/>
           </a:xfrm>
         </p:spPr>
         <p:txBody>
@@ -289,7 +290,7 @@
         <p:spPr bwMode="auto">
           <a:xfrm>
             <a:off x="381000" y="0"/>
-            <a:ext cx="609600" cy="6858000"/>
+            <a:ext cx="609600" cy="5143500"/>
           </a:xfrm>
           <a:prstGeom prst="rect">
             <a:avLst/>
@@ -338,7 +339,7 @@
         <p:spPr bwMode="auto">
           <a:xfrm>
             <a:off x="276336" y="0"/>
-            <a:ext cx="104664" cy="6858000"/>
+            <a:ext cx="104664" cy="5143500"/>
           </a:xfrm>
           <a:prstGeom prst="rect">
             <a:avLst/>
@@ -387,7 +388,7 @@
         <p:spPr bwMode="auto">
           <a:xfrm>
             <a:off x="990600" y="0"/>
-            <a:ext cx="181872" cy="6858000"/>
+            <a:ext cx="181872" cy="5143500"/>
           </a:xfrm>
           <a:prstGeom prst="rect">
             <a:avLst/>
@@ -436,7 +437,7 @@
         <p:spPr bwMode="auto">
           <a:xfrm>
             <a:off x="1141320" y="0"/>
-            <a:ext cx="230280" cy="6858000"/>
+            <a:ext cx="230280" cy="5143500"/>
           </a:xfrm>
           <a:prstGeom prst="rect">
             <a:avLst/>
@@ -487,7 +488,7 @@
         <p:spPr bwMode="auto">
           <a:xfrm>
             <a:off x="106344" y="0"/>
-            <a:ext cx="0" cy="6858000"/>
+            <a:ext cx="0" cy="5143500"/>
           </a:xfrm>
           <a:prstGeom prst="line">
             <a:avLst/>
@@ -526,7 +527,7 @@
         <p:spPr bwMode="auto">
           <a:xfrm>
             <a:off x="914400" y="0"/>
-            <a:ext cx="0" cy="6858000"/>
+            <a:ext cx="0" cy="5143500"/>
           </a:xfrm>
           <a:prstGeom prst="line">
             <a:avLst/>
@@ -565,7 +566,7 @@
         <p:spPr bwMode="auto">
           <a:xfrm>
             <a:off x="854112" y="0"/>
-            <a:ext cx="0" cy="6858000"/>
+            <a:ext cx="0" cy="5143500"/>
           </a:xfrm>
           <a:prstGeom prst="line">
             <a:avLst/>
@@ -603,7 +604,7 @@
         <p:spPr bwMode="auto">
           <a:xfrm>
             <a:off x="1726640" y="0"/>
-            <a:ext cx="0" cy="6858000"/>
+            <a:ext cx="0" cy="5143500"/>
           </a:xfrm>
           <a:prstGeom prst="line">
             <a:avLst/>
@@ -642,7 +643,7 @@
         <p:spPr bwMode="auto">
           <a:xfrm>
             <a:off x="1066800" y="0"/>
-            <a:ext cx="0" cy="6858000"/>
+            <a:ext cx="0" cy="5143500"/>
           </a:xfrm>
           <a:prstGeom prst="line">
             <a:avLst/>
@@ -680,7 +681,7 @@
         <p:spPr bwMode="auto">
           <a:xfrm>
             <a:off x="9113856" y="0"/>
-            <a:ext cx="0" cy="6858000"/>
+            <a:ext cx="0" cy="5143500"/>
           </a:xfrm>
           <a:prstGeom prst="line">
             <a:avLst/>
@@ -716,7 +717,7 @@
         <p:spPr bwMode="auto">
           <a:xfrm>
             <a:off x="1219200" y="0"/>
-            <a:ext cx="76200" cy="6858000"/>
+            <a:ext cx="76200" cy="5143500"/>
           </a:xfrm>
           <a:prstGeom prst="rect">
             <a:avLst/>
@@ -764,8 +765,8 @@
         </p:nvSpPr>
         <p:spPr bwMode="auto">
           <a:xfrm>
-            <a:off x="609600" y="3429000"/>
-            <a:ext cx="1295400" cy="1295400"/>
+            <a:off x="609600" y="2571750"/>
+            <a:ext cx="1295400" cy="971550"/>
           </a:xfrm>
           <a:prstGeom prst="ellipse">
             <a:avLst/>
@@ -810,8 +811,8 @@
         </p:nvSpPr>
         <p:spPr bwMode="auto">
           <a:xfrm>
-            <a:off x="1309632" y="4866752"/>
-            <a:ext cx="641424" cy="641424"/>
+            <a:off x="1309632" y="3650064"/>
+            <a:ext cx="641424" cy="481068"/>
           </a:xfrm>
           <a:prstGeom prst="ellipse">
             <a:avLst/>
@@ -853,8 +854,8 @@
         </p:nvSpPr>
         <p:spPr bwMode="auto">
           <a:xfrm>
-            <a:off x="1091080" y="5500632"/>
-            <a:ext cx="137160" cy="137160"/>
+            <a:off x="1091080" y="4125474"/>
+            <a:ext cx="137160" cy="102870"/>
           </a:xfrm>
           <a:prstGeom prst="ellipse">
             <a:avLst/>
@@ -896,8 +897,8 @@
         </p:nvSpPr>
         <p:spPr bwMode="auto">
           <a:xfrm>
-            <a:off x="1664208" y="5788152"/>
-            <a:ext cx="274320" cy="274320"/>
+            <a:off x="1664208" y="4341114"/>
+            <a:ext cx="274320" cy="205740"/>
           </a:xfrm>
           <a:prstGeom prst="ellipse">
             <a:avLst/>
@@ -939,8 +940,8 @@
         </p:nvSpPr>
         <p:spPr>
           <a:xfrm>
-            <a:off x="1905000" y="4495800"/>
-            <a:ext cx="365760" cy="365760"/>
+            <a:off x="1905000" y="3371850"/>
+            <a:ext cx="365760" cy="274320"/>
           </a:xfrm>
           <a:prstGeom prst="ellipse">
             <a:avLst/>
@@ -986,8 +987,8 @@
         </p:nvSpPr>
         <p:spPr bwMode="auto">
           <a:xfrm>
-            <a:off x="1325544" y="4928702"/>
-            <a:ext cx="609600" cy="517524"/>
+            <a:off x="1325544" y="3696527"/>
+            <a:ext cx="609600" cy="388143"/>
           </a:xfrm>
         </p:spPr>
         <p:txBody>
@@ -1121,7 +1122,7 @@
             <a:fld id="{86B5546F-C09B-4E63-ABC5-F7C86A7E8D66}" type="datetimeFigureOut">
               <a:rPr lang="en-US" smtClean="0"/>
               <a:pPr/>
-              <a:t>6/9/2019</a:t>
+              <a:t>8/17/2019</a:t>
             </a:fld>
             <a:endParaRPr lang="en-US"/>
           </a:p>
@@ -1207,8 +1208,8 @@
         </p:nvSpPr>
         <p:spPr>
           <a:xfrm>
-            <a:off x="6629400" y="274639"/>
-            <a:ext cx="1676400" cy="5851525"/>
+            <a:off x="6629400" y="205980"/>
+            <a:ext cx="1676400" cy="4388644"/>
           </a:xfrm>
         </p:spPr>
         <p:txBody>
@@ -1235,8 +1236,8 @@
         </p:nvSpPr>
         <p:spPr>
           <a:xfrm>
-            <a:off x="457200" y="274638"/>
-            <a:ext cx="6019800" cy="5851525"/>
+            <a:off x="457200" y="205979"/>
+            <a:ext cx="6019800" cy="4388644"/>
           </a:xfrm>
         </p:spPr>
         <p:txBody>
@@ -1298,7 +1299,7 @@
             <a:fld id="{86B5546F-C09B-4E63-ABC5-F7C86A7E8D66}" type="datetimeFigureOut">
               <a:rPr lang="en-US" smtClean="0"/>
               <a:pPr/>
-              <a:t>6/9/2019</a:t>
+              <a:t>8/17/2019</a:t>
             </a:fld>
             <a:endParaRPr lang="en-US"/>
           </a:p>
@@ -1407,8 +1408,8 @@
         </p:nvSpPr>
         <p:spPr>
           <a:xfrm>
-            <a:off x="457200" y="1600200"/>
-            <a:ext cx="7467600" cy="4873752"/>
+            <a:off x="457200" y="1200150"/>
+            <a:ext cx="7467600" cy="3655314"/>
           </a:xfrm>
         </p:spPr>
         <p:txBody>
@@ -1470,7 +1471,7 @@
             <a:fld id="{86B5546F-C09B-4E63-ABC5-F7C86A7E8D66}" type="datetimeFigureOut">
               <a:rPr lang="en-US" smtClean="0"/>
               <a:pPr/>
-              <a:t>6/9/2019</a:t>
+              <a:t>8/17/2019</a:t>
             </a:fld>
             <a:endParaRPr lang="en-US"/>
           </a:p>
@@ -1561,8 +1562,8 @@
         </p:nvSpPr>
         <p:spPr>
           <a:xfrm>
-            <a:off x="2286000" y="2895600"/>
-            <a:ext cx="6172200" cy="2053590"/>
+            <a:off x="2286000" y="2171700"/>
+            <a:ext cx="6172200" cy="1540193"/>
           </a:xfrm>
         </p:spPr>
         <p:txBody>
@@ -1594,8 +1595,8 @@
         </p:nvSpPr>
         <p:spPr>
           <a:xfrm>
-            <a:off x="2286000" y="5010150"/>
-            <a:ext cx="6172200" cy="1371600"/>
+            <a:off x="2286000" y="3757613"/>
+            <a:ext cx="6172200" cy="1028700"/>
           </a:xfrm>
         </p:spPr>
         <p:txBody>
@@ -1671,8 +1672,8 @@
         </p:nvSpPr>
         <p:spPr bwMode="auto">
           <a:xfrm rot="5400000">
-            <a:off x="7763256" y="1170432"/>
-            <a:ext cx="2286000" cy="381000"/>
+            <a:off x="8049006" y="830199"/>
+            <a:ext cx="1714500" cy="381000"/>
           </a:xfrm>
         </p:spPr>
         <p:txBody>
@@ -1682,7 +1683,7 @@
             <a:fld id="{86B5546F-C09B-4E63-ABC5-F7C86A7E8D66}" type="datetimeFigureOut">
               <a:rPr lang="en-US" smtClean="0"/>
               <a:pPr/>
-              <a:t>6/9/2019</a:t>
+              <a:t>8/17/2019</a:t>
             </a:fld>
             <a:endParaRPr lang="en-US"/>
           </a:p>
@@ -1700,8 +1701,8 @@
         </p:nvSpPr>
         <p:spPr bwMode="auto">
           <a:xfrm rot="5400000">
-            <a:off x="7077456" y="4178808"/>
-            <a:ext cx="3657600" cy="384048"/>
+            <a:off x="7534656" y="3086100"/>
+            <a:ext cx="2743200" cy="384048"/>
           </a:xfrm>
         </p:spPr>
         <p:txBody>
@@ -1721,7 +1722,7 @@
         <p:spPr bwMode="auto">
           <a:xfrm>
             <a:off x="381000" y="0"/>
-            <a:ext cx="609600" cy="6858000"/>
+            <a:ext cx="609600" cy="5143500"/>
           </a:xfrm>
           <a:prstGeom prst="rect">
             <a:avLst/>
@@ -1770,7 +1771,7 @@
         <p:spPr bwMode="auto">
           <a:xfrm>
             <a:off x="276336" y="0"/>
-            <a:ext cx="104664" cy="6858000"/>
+            <a:ext cx="104664" cy="5143500"/>
           </a:xfrm>
           <a:prstGeom prst="rect">
             <a:avLst/>
@@ -1819,7 +1820,7 @@
         <p:spPr bwMode="auto">
           <a:xfrm>
             <a:off x="990600" y="0"/>
-            <a:ext cx="181872" cy="6858000"/>
+            <a:ext cx="181872" cy="5143500"/>
           </a:xfrm>
           <a:prstGeom prst="rect">
             <a:avLst/>
@@ -1868,7 +1869,7 @@
         <p:spPr bwMode="auto">
           <a:xfrm>
             <a:off x="1141320" y="0"/>
-            <a:ext cx="230280" cy="6858000"/>
+            <a:ext cx="230280" cy="5143500"/>
           </a:xfrm>
           <a:prstGeom prst="rect">
             <a:avLst/>
@@ -1919,7 +1920,7 @@
         <p:spPr bwMode="auto">
           <a:xfrm>
             <a:off x="106344" y="0"/>
-            <a:ext cx="0" cy="6858000"/>
+            <a:ext cx="0" cy="5143500"/>
           </a:xfrm>
           <a:prstGeom prst="line">
             <a:avLst/>
@@ -1958,7 +1959,7 @@
         <p:spPr bwMode="auto">
           <a:xfrm>
             <a:off x="914400" y="0"/>
-            <a:ext cx="0" cy="6858000"/>
+            <a:ext cx="0" cy="5143500"/>
           </a:xfrm>
           <a:prstGeom prst="line">
             <a:avLst/>
@@ -1997,7 +1998,7 @@
         <p:spPr bwMode="auto">
           <a:xfrm>
             <a:off x="854112" y="0"/>
-            <a:ext cx="0" cy="6858000"/>
+            <a:ext cx="0" cy="5143500"/>
           </a:xfrm>
           <a:prstGeom prst="line">
             <a:avLst/>
@@ -2035,7 +2036,7 @@
         <p:spPr bwMode="auto">
           <a:xfrm>
             <a:off x="1726640" y="0"/>
-            <a:ext cx="0" cy="6858000"/>
+            <a:ext cx="0" cy="5143500"/>
           </a:xfrm>
           <a:prstGeom prst="line">
             <a:avLst/>
@@ -2074,7 +2075,7 @@
         <p:spPr bwMode="auto">
           <a:xfrm>
             <a:off x="1066800" y="0"/>
-            <a:ext cx="0" cy="6858000"/>
+            <a:ext cx="0" cy="5143500"/>
           </a:xfrm>
           <a:prstGeom prst="line">
             <a:avLst/>
@@ -2110,7 +2111,7 @@
         <p:spPr bwMode="auto">
           <a:xfrm>
             <a:off x="1219200" y="0"/>
-            <a:ext cx="76200" cy="6858000"/>
+            <a:ext cx="76200" cy="5143500"/>
           </a:xfrm>
           <a:prstGeom prst="rect">
             <a:avLst/>
@@ -2158,8 +2159,8 @@
         </p:nvSpPr>
         <p:spPr bwMode="auto">
           <a:xfrm>
-            <a:off x="609600" y="3429000"/>
-            <a:ext cx="1295400" cy="1295400"/>
+            <a:off x="609600" y="2571750"/>
+            <a:ext cx="1295400" cy="971550"/>
           </a:xfrm>
           <a:prstGeom prst="ellipse">
             <a:avLst/>
@@ -2201,8 +2202,8 @@
         </p:nvSpPr>
         <p:spPr bwMode="auto">
           <a:xfrm>
-            <a:off x="1324704" y="4866752"/>
-            <a:ext cx="641424" cy="641424"/>
+            <a:off x="1324704" y="3650064"/>
+            <a:ext cx="641424" cy="481068"/>
           </a:xfrm>
           <a:prstGeom prst="ellipse">
             <a:avLst/>
@@ -2244,8 +2245,8 @@
         </p:nvSpPr>
         <p:spPr bwMode="auto">
           <a:xfrm>
-            <a:off x="1091080" y="5500632"/>
-            <a:ext cx="137160" cy="137160"/>
+            <a:off x="1091080" y="4125474"/>
+            <a:ext cx="137160" cy="102870"/>
           </a:xfrm>
           <a:prstGeom prst="ellipse">
             <a:avLst/>
@@ -2287,8 +2288,8 @@
         </p:nvSpPr>
         <p:spPr bwMode="auto">
           <a:xfrm>
-            <a:off x="1664208" y="5791200"/>
-            <a:ext cx="274320" cy="274320"/>
+            <a:off x="1664208" y="4343400"/>
+            <a:ext cx="274320" cy="205740"/>
           </a:xfrm>
           <a:prstGeom prst="ellipse">
             <a:avLst/>
@@ -2330,8 +2331,8 @@
         </p:nvSpPr>
         <p:spPr bwMode="auto">
           <a:xfrm>
-            <a:off x="1879040" y="4479888"/>
-            <a:ext cx="365760" cy="365760"/>
+            <a:off x="1879040" y="3359916"/>
+            <a:ext cx="365760" cy="274320"/>
           </a:xfrm>
           <a:prstGeom prst="ellipse">
             <a:avLst/>
@@ -2376,7 +2377,7 @@
         <p:spPr bwMode="auto">
           <a:xfrm>
             <a:off x="9097944" y="0"/>
-            <a:ext cx="0" cy="6858000"/>
+            <a:ext cx="0" cy="5143500"/>
           </a:xfrm>
           <a:prstGeom prst="line">
             <a:avLst/>
@@ -2415,8 +2416,8 @@
         </p:nvSpPr>
         <p:spPr bwMode="auto">
           <a:xfrm>
-            <a:off x="1340616" y="4928702"/>
-            <a:ext cx="609600" cy="517524"/>
+            <a:off x="1340616" y="3696527"/>
+            <a:ext cx="609600" cy="388143"/>
           </a:xfrm>
         </p:spPr>
         <p:txBody>
@@ -2498,7 +2499,7 @@
             <a:fld id="{86B5546F-C09B-4E63-ABC5-F7C86A7E8D66}" type="datetimeFigureOut">
               <a:rPr lang="en-US" smtClean="0"/>
               <a:pPr/>
-              <a:t>6/9/2019</a:t>
+              <a:t>8/17/2019</a:t>
             </a:fld>
             <a:endParaRPr lang="en-US"/>
           </a:p>
@@ -2559,8 +2560,8 @@
         </p:nvSpPr>
         <p:spPr>
           <a:xfrm>
-            <a:off x="457200" y="1600200"/>
-            <a:ext cx="3657600" cy="4572000"/>
+            <a:off x="457200" y="1200150"/>
+            <a:ext cx="3657600" cy="3429000"/>
           </a:xfrm>
         </p:spPr>
         <p:txBody>
@@ -2616,8 +2617,8 @@
         </p:nvSpPr>
         <p:spPr>
           <a:xfrm>
-            <a:off x="4270248" y="1600200"/>
-            <a:ext cx="3657600" cy="4572000"/>
+            <a:off x="4270248" y="1200150"/>
+            <a:ext cx="3657600" cy="3429000"/>
           </a:xfrm>
         </p:spPr>
         <p:txBody>
@@ -2698,8 +2699,8 @@
         </p:nvSpPr>
         <p:spPr>
           <a:xfrm>
-            <a:off x="457200" y="273050"/>
-            <a:ext cx="7543800" cy="1143000"/>
+            <a:off x="457200" y="204788"/>
+            <a:ext cx="7543800" cy="857250"/>
           </a:xfrm>
         </p:spPr>
         <p:txBody>
@@ -2736,7 +2737,7 @@
             <a:fld id="{86B5546F-C09B-4E63-ABC5-F7C86A7E8D66}" type="datetimeFigureOut">
               <a:rPr lang="en-US" smtClean="0"/>
               <a:pPr/>
-              <a:t>6/9/2019</a:t>
+              <a:t>8/17/2019</a:t>
             </a:fld>
             <a:endParaRPr lang="en-US"/>
           </a:p>
@@ -2797,8 +2798,8 @@
         </p:nvSpPr>
         <p:spPr>
           <a:xfrm>
-            <a:off x="457200" y="2362200"/>
-            <a:ext cx="3657600" cy="3886200"/>
+            <a:off x="457200" y="1771650"/>
+            <a:ext cx="3657600" cy="2914650"/>
           </a:xfrm>
         </p:spPr>
         <p:txBody>
@@ -2854,8 +2855,8 @@
         </p:nvSpPr>
         <p:spPr>
           <a:xfrm>
-            <a:off x="4371975" y="2362200"/>
-            <a:ext cx="3657600" cy="3886200"/>
+            <a:off x="4371975" y="1771650"/>
+            <a:ext cx="3657600" cy="2914650"/>
           </a:xfrm>
         </p:spPr>
         <p:txBody>
@@ -2911,8 +2912,8 @@
         </p:nvSpPr>
         <p:spPr>
           <a:xfrm>
-            <a:off x="457200" y="1569720"/>
-            <a:ext cx="3657600" cy="658368"/>
+            <a:off x="457200" y="1177290"/>
+            <a:ext cx="3657600" cy="493776"/>
           </a:xfrm>
           <a:prstGeom prst="roundRect">
             <a:avLst>
@@ -2959,8 +2960,8 @@
         </p:nvSpPr>
         <p:spPr>
           <a:xfrm>
-            <a:off x="4343400" y="1569720"/>
-            <a:ext cx="3657600" cy="658368"/>
+            <a:off x="4343400" y="1177290"/>
+            <a:ext cx="3657600" cy="493776"/>
           </a:xfrm>
           <a:prstGeom prst="roundRect">
             <a:avLst>
@@ -3061,7 +3062,7 @@
             <a:fld id="{86B5546F-C09B-4E63-ABC5-F7C86A7E8D66}" type="datetimeFigureOut">
               <a:rPr lang="en-US" smtClean="0"/>
               <a:pPr/>
-              <a:t>6/9/2019</a:t>
+              <a:t>8/17/2019</a:t>
             </a:fld>
             <a:endParaRPr lang="en-US"/>
           </a:p>
@@ -3153,7 +3154,7 @@
             <a:fld id="{86B5546F-C09B-4E63-ABC5-F7C86A7E8D66}" type="datetimeFigureOut">
               <a:rPr lang="en-US" smtClean="0"/>
               <a:pPr/>
-              <a:t>6/9/2019</a:t>
+              <a:t>8/17/2019</a:t>
             </a:fld>
             <a:endParaRPr lang="en-US"/>
           </a:p>
@@ -3243,7 +3244,7 @@
         <p:spPr bwMode="auto">
           <a:xfrm>
             <a:off x="8763000" y="0"/>
-            <a:ext cx="0" cy="6858000"/>
+            <a:ext cx="0" cy="5143500"/>
           </a:xfrm>
           <a:prstGeom prst="line">
             <a:avLst/>
@@ -3283,8 +3284,8 @@
         </p:nvSpPr>
         <p:spPr>
           <a:xfrm rot="5400000">
-            <a:off x="3371850" y="3200400"/>
-            <a:ext cx="6309360" cy="457200"/>
+            <a:off x="4160520" y="2343150"/>
+            <a:ext cx="4732020" cy="457200"/>
           </a:xfrm>
         </p:spPr>
         <p:txBody>
@@ -3316,8 +3317,8 @@
         </p:nvSpPr>
         <p:spPr>
           <a:xfrm>
-            <a:off x="6812280" y="274320"/>
-            <a:ext cx="1527048" cy="4983480"/>
+            <a:off x="6812280" y="205740"/>
+            <a:ext cx="1527048" cy="3737610"/>
           </a:xfrm>
         </p:spPr>
         <p:txBody>
@@ -3370,7 +3371,7 @@
         <p:spPr bwMode="auto">
           <a:xfrm>
             <a:off x="6248400" y="0"/>
-            <a:ext cx="0" cy="6858000"/>
+            <a:ext cx="0" cy="5143500"/>
           </a:xfrm>
           <a:prstGeom prst="line">
             <a:avLst/>
@@ -3408,7 +3409,7 @@
         <p:spPr bwMode="auto">
           <a:xfrm>
             <a:off x="6192296" y="0"/>
-            <a:ext cx="0" cy="6858000"/>
+            <a:ext cx="0" cy="5143500"/>
           </a:xfrm>
           <a:prstGeom prst="line">
             <a:avLst/>
@@ -3444,7 +3445,7 @@
         <p:spPr bwMode="auto">
           <a:xfrm>
             <a:off x="8991600" y="0"/>
-            <a:ext cx="0" cy="6858000"/>
+            <a:ext cx="0" cy="5143500"/>
           </a:xfrm>
           <a:prstGeom prst="line">
             <a:avLst/>
@@ -3478,7 +3479,7 @@
         <p:spPr bwMode="auto">
           <a:xfrm>
             <a:off x="8839200" y="0"/>
-            <a:ext cx="304800" cy="6858000"/>
+            <a:ext cx="304800" cy="5143500"/>
           </a:xfrm>
           <a:prstGeom prst="rect">
             <a:avLst/>
@@ -3529,7 +3530,7 @@
         <p:spPr bwMode="auto">
           <a:xfrm>
             <a:off x="8915400" y="0"/>
-            <a:ext cx="0" cy="6858000"/>
+            <a:ext cx="0" cy="5143500"/>
           </a:xfrm>
           <a:prstGeom prst="line">
             <a:avLst/>
@@ -3562,8 +3563,8 @@
         </p:nvSpPr>
         <p:spPr>
           <a:xfrm>
-            <a:off x="8156448" y="5715000"/>
-            <a:ext cx="548640" cy="548640"/>
+            <a:off x="8156448" y="4286250"/>
+            <a:ext cx="548640" cy="411480"/>
           </a:xfrm>
           <a:prstGeom prst="ellipse">
             <a:avLst/>
@@ -3609,8 +3610,8 @@
         </p:nvSpPr>
         <p:spPr>
           <a:xfrm>
-            <a:off x="304800" y="274320"/>
-            <a:ext cx="5638800" cy="6327648"/>
+            <a:off x="304800" y="205740"/>
+            <a:ext cx="5638800" cy="4745736"/>
           </a:xfrm>
         </p:spPr>
         <p:txBody>
@@ -3672,7 +3673,7 @@
             <a:fld id="{86B5546F-C09B-4E63-ABC5-F7C86A7E8D66}" type="datetimeFigureOut">
               <a:rPr lang="en-US" smtClean="0"/>
               <a:pPr/>
-              <a:t>6/9/2019</a:t>
+              <a:t>8/17/2019</a:t>
             </a:fld>
             <a:endParaRPr lang="en-US"/>
           </a:p>
@@ -3757,7 +3758,7 @@
         <p:spPr bwMode="auto">
           <a:xfrm>
             <a:off x="8763000" y="0"/>
-            <a:ext cx="0" cy="6858000"/>
+            <a:ext cx="0" cy="5143500"/>
           </a:xfrm>
           <a:prstGeom prst="line">
             <a:avLst/>
@@ -3792,8 +3793,8 @@
         </p:nvSpPr>
         <p:spPr>
           <a:xfrm>
-            <a:off x="8156448" y="5715000"/>
-            <a:ext cx="548640" cy="548640"/>
+            <a:off x="8156448" y="4286250"/>
+            <a:ext cx="548640" cy="411480"/>
           </a:xfrm>
           <a:prstGeom prst="ellipse">
             <a:avLst/>
@@ -3839,8 +3840,8 @@
         </p:nvSpPr>
         <p:spPr>
           <a:xfrm rot="5400000">
-            <a:off x="3350133" y="3200400"/>
-            <a:ext cx="6309360" cy="457200"/>
+            <a:off x="4138803" y="2343150"/>
+            <a:ext cx="4732020" cy="457200"/>
           </a:xfrm>
         </p:spPr>
         <p:txBody>
@@ -3873,7 +3874,7 @@
         <p:spPr>
           <a:xfrm>
             <a:off x="0" y="0"/>
-            <a:ext cx="6172200" cy="6858000"/>
+            <a:ext cx="6172200" cy="5143500"/>
           </a:xfrm>
           <a:solidFill>
             <a:schemeClr val="bg2"/>
@@ -3931,8 +3932,8 @@
         </p:nvSpPr>
         <p:spPr>
           <a:xfrm>
-            <a:off x="6765798" y="264795"/>
-            <a:ext cx="1524000" cy="4956048"/>
+            <a:off x="6765798" y="198596"/>
+            <a:ext cx="1524000" cy="3717036"/>
           </a:xfrm>
         </p:spPr>
         <p:txBody>
@@ -3984,7 +3985,7 @@
         <p:spPr bwMode="auto">
           <a:xfrm>
             <a:off x="8991600" y="0"/>
-            <a:ext cx="0" cy="6858000"/>
+            <a:ext cx="0" cy="5143500"/>
           </a:xfrm>
           <a:prstGeom prst="line">
             <a:avLst/>
@@ -4018,7 +4019,7 @@
         <p:spPr bwMode="auto">
           <a:xfrm>
             <a:off x="8839200" y="0"/>
-            <a:ext cx="304800" cy="6858000"/>
+            <a:ext cx="304800" cy="5143500"/>
           </a:xfrm>
           <a:prstGeom prst="rect">
             <a:avLst/>
@@ -4068,7 +4069,7 @@
         <p:spPr bwMode="auto">
           <a:xfrm>
             <a:off x="8915400" y="0"/>
-            <a:ext cx="0" cy="6858000"/>
+            <a:ext cx="0" cy="5143500"/>
           </a:xfrm>
           <a:prstGeom prst="line">
             <a:avLst/>
@@ -4104,7 +4105,7 @@
         <p:spPr bwMode="auto">
           <a:xfrm>
             <a:off x="6248400" y="0"/>
-            <a:ext cx="0" cy="6858000"/>
+            <a:ext cx="0" cy="5143500"/>
           </a:xfrm>
           <a:prstGeom prst="line">
             <a:avLst/>
@@ -4142,7 +4143,7 @@
         <p:spPr bwMode="auto">
           <a:xfrm>
             <a:off x="6192296" y="0"/>
-            <a:ext cx="0" cy="6858000"/>
+            <a:ext cx="0" cy="5143500"/>
           </a:xfrm>
           <a:prstGeom prst="line">
             <a:avLst/>
@@ -4185,7 +4186,7 @@
             <a:fld id="{86B5546F-C09B-4E63-ABC5-F7C86A7E8D66}" type="datetimeFigureOut">
               <a:rPr lang="en-US" smtClean="0"/>
               <a:pPr/>
-              <a:t>6/9/2019</a:t>
+              <a:t>8/17/2019</a:t>
             </a:fld>
             <a:endParaRPr lang="en-US"/>
           </a:p>
@@ -4275,7 +4276,7 @@
         <p:spPr bwMode="auto">
           <a:xfrm>
             <a:off x="8763000" y="0"/>
-            <a:ext cx="0" cy="6858000"/>
+            <a:ext cx="0" cy="5143500"/>
           </a:xfrm>
           <a:prstGeom prst="line">
             <a:avLst/>
@@ -4315,8 +4316,8 @@
         </p:nvSpPr>
         <p:spPr>
           <a:xfrm>
-            <a:off x="457200" y="274638"/>
-            <a:ext cx="7467600" cy="1143000"/>
+            <a:off x="457200" y="205979"/>
+            <a:ext cx="7467600" cy="857250"/>
           </a:xfrm>
           <a:prstGeom prst="rect">
             <a:avLst/>
@@ -4348,8 +4349,8 @@
         </p:nvSpPr>
         <p:spPr>
           <a:xfrm>
-            <a:off x="457200" y="1600200"/>
-            <a:ext cx="7467600" cy="4873752"/>
+            <a:off x="457200" y="1200150"/>
+            <a:ext cx="7467600" cy="3655314"/>
           </a:xfrm>
           <a:prstGeom prst="rect">
             <a:avLst/>
@@ -4410,8 +4411,8 @@
         </p:nvSpPr>
         <p:spPr>
           <a:xfrm rot="5400000">
-            <a:off x="7589520" y="1081851"/>
-            <a:ext cx="2011680" cy="384048"/>
+            <a:off x="7840980" y="763382"/>
+            <a:ext cx="1508760" cy="384048"/>
           </a:xfrm>
           <a:prstGeom prst="rect">
             <a:avLst/>
@@ -4432,7 +4433,7 @@
             <a:fld id="{86B5546F-C09B-4E63-ABC5-F7C86A7E8D66}" type="datetimeFigureOut">
               <a:rPr lang="en-US" smtClean="0"/>
               <a:pPr/>
-              <a:t>6/9/2019</a:t>
+              <a:t>8/17/2019</a:t>
             </a:fld>
             <a:endParaRPr lang="en-US"/>
           </a:p>
@@ -4450,8 +4451,8 @@
         </p:nvSpPr>
         <p:spPr>
           <a:xfrm rot="5400000">
-            <a:off x="6990186" y="3737240"/>
-            <a:ext cx="3200400" cy="365760"/>
+            <a:off x="7390236" y="2757210"/>
+            <a:ext cx="2400300" cy="365760"/>
           </a:xfrm>
           <a:prstGeom prst="rect">
             <a:avLst/>
@@ -4484,7 +4485,7 @@
         <p:spPr bwMode="auto">
           <a:xfrm>
             <a:off x="76200" y="0"/>
-            <a:ext cx="0" cy="6858000"/>
+            <a:ext cx="0" cy="5143500"/>
           </a:xfrm>
           <a:prstGeom prst="line">
             <a:avLst/>
@@ -4522,7 +4523,7 @@
         <p:spPr bwMode="auto">
           <a:xfrm>
             <a:off x="8991600" y="0"/>
-            <a:ext cx="0" cy="6858000"/>
+            <a:ext cx="0" cy="5143500"/>
           </a:xfrm>
           <a:prstGeom prst="line">
             <a:avLst/>
@@ -4556,7 +4557,7 @@
         <p:spPr bwMode="auto">
           <a:xfrm>
             <a:off x="8839200" y="0"/>
-            <a:ext cx="304800" cy="6858000"/>
+            <a:ext cx="304800" cy="5143500"/>
           </a:xfrm>
           <a:prstGeom prst="rect">
             <a:avLst/>
@@ -4607,7 +4608,7 @@
         <p:spPr bwMode="auto">
           <a:xfrm>
             <a:off x="8915400" y="0"/>
-            <a:ext cx="0" cy="6858000"/>
+            <a:ext cx="0" cy="5143500"/>
           </a:xfrm>
           <a:prstGeom prst="line">
             <a:avLst/>
@@ -4640,8 +4641,8 @@
         </p:nvSpPr>
         <p:spPr>
           <a:xfrm>
-            <a:off x="8156448" y="5715000"/>
-            <a:ext cx="548640" cy="548640"/>
+            <a:off x="8156448" y="4286250"/>
+            <a:ext cx="548640" cy="411480"/>
           </a:xfrm>
           <a:prstGeom prst="ellipse">
             <a:avLst/>
@@ -4687,8 +4688,8 @@
         </p:nvSpPr>
         <p:spPr>
           <a:xfrm>
-            <a:off x="8129016" y="5734050"/>
-            <a:ext cx="609600" cy="521208"/>
+            <a:off x="8129016" y="4300538"/>
+            <a:ext cx="609600" cy="390906"/>
           </a:xfrm>
           <a:prstGeom prst="rect">
             <a:avLst/>
@@ -5169,50 +5170,61 @@
         <p:spPr>
           <a:xfrm>
             <a:off x="0" y="0"/>
-            <a:ext cx="9144000" cy="7010400"/>
+            <a:ext cx="9144000" cy="5257800"/>
           </a:xfrm>
         </p:spPr>
         <p:txBody>
           <a:bodyPr>
-            <a:normAutofit/>
+            <a:noAutofit/>
           </a:bodyPr>
           <a:lstStyle/>
           <a:p>
             <a:r>
-              <a:rPr lang="zh-TW" altLang="en-US" sz="5400" dirty="0" smtClean="0"/>
+              <a:rPr lang="zh-TW" altLang="en-US" sz="4800" dirty="0" smtClean="0">
+                <a:latin typeface="Microsoft JhengHei" pitchFamily="34" charset="-120"/>
+                <a:ea typeface="Microsoft JhengHei" pitchFamily="34" charset="-120"/>
+              </a:rPr>
               <a:t>神是我堅固的保障；他引導完全人行他的路。</a:t>
             </a:r>
             <a:r>
-              <a:rPr lang="en-US" altLang="zh-TW" sz="5400" dirty="0" smtClean="0"/>
+              <a:rPr lang="en-US" altLang="zh-TW" sz="4800" dirty="0" smtClean="0">
+                <a:latin typeface="Microsoft JhengHei" pitchFamily="34" charset="-120"/>
+                <a:ea typeface="Microsoft JhengHei" pitchFamily="34" charset="-120"/>
+              </a:rPr>
               <a:t> </a:t>
             </a:r>
           </a:p>
           <a:p>
             <a:r>
-              <a:rPr lang="zh-TW" altLang="en-US" sz="5400" b="1" dirty="0" smtClean="0"/>
+              <a:rPr lang="zh-TW" altLang="en-US" sz="4800" b="1" dirty="0" smtClean="0">
+                <a:latin typeface="Microsoft JhengHei" pitchFamily="34" charset="-120"/>
+                <a:ea typeface="Microsoft JhengHei" pitchFamily="34" charset="-120"/>
+              </a:rPr>
               <a:t>他使我的腳快如母鹿的蹄，又使我在高處安穩。</a:t>
             </a:r>
             <a:r>
-              <a:rPr lang="en-US" altLang="zh-TW" sz="5400" b="1" dirty="0" smtClean="0"/>
+              <a:rPr lang="en-US" altLang="zh-TW" sz="4800" b="1" dirty="0" smtClean="0">
+                <a:latin typeface="Microsoft JhengHei" pitchFamily="34" charset="-120"/>
+                <a:ea typeface="Microsoft JhengHei" pitchFamily="34" charset="-120"/>
+              </a:rPr>
               <a:t> </a:t>
             </a:r>
           </a:p>
           <a:p>
             <a:r>
-              <a:rPr lang="zh-TW" altLang="en-US" sz="5400" dirty="0" smtClean="0"/>
+              <a:rPr lang="zh-TW" altLang="en-US" sz="4800" dirty="0" smtClean="0">
+                <a:latin typeface="Microsoft JhengHei" pitchFamily="34" charset="-120"/>
+                <a:ea typeface="Microsoft JhengHei" pitchFamily="34" charset="-120"/>
+              </a:rPr>
               <a:t>他教導我的手能以爭戰，甚至我的膀臂能開銅弓。</a:t>
             </a:r>
             <a:r>
-              <a:rPr lang="en-US" altLang="zh-TW" sz="5400" dirty="0" smtClean="0"/>
+              <a:rPr lang="en-US" altLang="zh-TW" sz="4800" dirty="0" smtClean="0">
+                <a:latin typeface="Microsoft JhengHei" pitchFamily="34" charset="-120"/>
+                <a:ea typeface="Microsoft JhengHei" pitchFamily="34" charset="-120"/>
+              </a:rPr>
               <a:t> </a:t>
             </a:r>
-          </a:p>
-          <a:p>
-            <a:r>
-              <a:rPr lang="zh-TW" altLang="en-US" sz="5400" b="1" dirty="0" smtClean="0"/>
-              <a:t>你把你的救恩給我作盾牌；你的溫和使我為大。</a:t>
-            </a:r>
-            <a:endParaRPr lang="en-US" altLang="zh-TW" sz="5400" b="1" dirty="0" smtClean="0"/>
           </a:p>
         </p:txBody>
       </p:sp>
@@ -5261,41 +5273,78 @@
         <p:spPr>
           <a:xfrm>
             <a:off x="0" y="0"/>
-            <a:ext cx="9144000" cy="7010400"/>
+            <a:ext cx="9144000" cy="5257800"/>
           </a:xfrm>
         </p:spPr>
         <p:txBody>
           <a:bodyPr>
-            <a:normAutofit/>
+            <a:noAutofit/>
           </a:bodyPr>
           <a:lstStyle/>
           <a:p>
             <a:r>
-              <a:rPr lang="zh-TW" altLang="en-US" sz="5400" dirty="0" smtClean="0"/>
+              <a:rPr lang="zh-TW" altLang="en-US" sz="4800" b="1" dirty="0" smtClean="0">
+                <a:latin typeface="Microsoft JhengHei" pitchFamily="34" charset="-120"/>
+                <a:ea typeface="Microsoft JhengHei" pitchFamily="34" charset="-120"/>
+              </a:rPr>
+              <a:t>你</a:t>
+            </a:r>
+            <a:r>
+              <a:rPr lang="zh-TW" altLang="en-US" sz="4800" b="1" dirty="0" smtClean="0">
+                <a:latin typeface="Microsoft JhengHei" pitchFamily="34" charset="-120"/>
+                <a:ea typeface="Microsoft JhengHei" pitchFamily="34" charset="-120"/>
+              </a:rPr>
+              <a:t>把你的救恩給我作盾牌；你的溫和使我為大</a:t>
+            </a:r>
+            <a:r>
+              <a:rPr lang="zh-TW" altLang="en-US" sz="4800" b="1" dirty="0" smtClean="0">
+                <a:latin typeface="Microsoft JhengHei" pitchFamily="34" charset="-120"/>
+                <a:ea typeface="Microsoft JhengHei" pitchFamily="34" charset="-120"/>
+              </a:rPr>
+              <a:t>。</a:t>
+            </a:r>
+            <a:endParaRPr lang="en-US" altLang="zh-TW" sz="4800" b="1" dirty="0" smtClean="0">
+              <a:latin typeface="Microsoft JhengHei" pitchFamily="34" charset="-120"/>
+              <a:ea typeface="Microsoft JhengHei" pitchFamily="34" charset="-120"/>
+            </a:endParaRPr>
+          </a:p>
+          <a:p>
+            <a:r>
+              <a:rPr lang="zh-TW" altLang="en-US" sz="4800" dirty="0">
+                <a:latin typeface="Microsoft JhengHei" pitchFamily="34" charset="-120"/>
+                <a:ea typeface="Microsoft JhengHei" pitchFamily="34" charset="-120"/>
+              </a:rPr>
               <a:t>你使我腳下的地步寬闊；我的腳未曾滑跌。</a:t>
             </a:r>
-            <a:endParaRPr lang="en-US" altLang="zh-TW" sz="5400" dirty="0" smtClean="0"/>
-          </a:p>
-          <a:p>
-            <a:r>
-              <a:rPr lang="zh-TW" altLang="en-US" sz="5400" b="1" dirty="0" smtClean="0"/>
+            <a:endParaRPr lang="en-US" altLang="zh-TW" sz="4800" dirty="0">
+              <a:latin typeface="Microsoft JhengHei" pitchFamily="34" charset="-120"/>
+              <a:ea typeface="Microsoft JhengHei" pitchFamily="34" charset="-120"/>
+            </a:endParaRPr>
+          </a:p>
+          <a:p>
+            <a:r>
+              <a:rPr lang="zh-TW" altLang="en-US" sz="4800" b="1" dirty="0">
+                <a:latin typeface="Microsoft JhengHei" pitchFamily="34" charset="-120"/>
+                <a:ea typeface="Microsoft JhengHei" pitchFamily="34" charset="-120"/>
+              </a:rPr>
               <a:t>住在至高者隱密處的，必住在全能者的蔭下。</a:t>
             </a:r>
             <a:r>
-              <a:rPr lang="en-US" altLang="zh-TW" sz="5400" b="1" dirty="0" smtClean="0"/>
+              <a:rPr lang="en-US" altLang="zh-TW" sz="4800" b="1" dirty="0">
+                <a:latin typeface="Microsoft JhengHei" pitchFamily="34" charset="-120"/>
+                <a:ea typeface="Microsoft JhengHei" pitchFamily="34" charset="-120"/>
+              </a:rPr>
               <a:t> </a:t>
             </a:r>
           </a:p>
-          <a:p>
-            <a:r>
-              <a:rPr lang="zh-TW" altLang="en-US" sz="5400" dirty="0" smtClean="0"/>
-              <a:t>我要論到耶和華說：他是我的避難所，是我的山寨，是我的神，是我所倚靠的。</a:t>
-            </a:r>
-            <a:endParaRPr lang="en-US" altLang="zh-TW" sz="5400" dirty="0" smtClean="0"/>
-          </a:p>
         </p:txBody>
       </p:sp>
     </p:spTree>
+    <p:extLst>
+      <p:ext uri="{BB962C8B-B14F-4D97-AF65-F5344CB8AC3E}">
+        <p14:creationId xmlns:p14="http://schemas.microsoft.com/office/powerpoint/2010/main" val="4236582016"/>
+      </p:ext>
+    </p:extLst>
   </p:cSld>
   <p:clrMapOvr>
     <a:masterClrMapping/>
@@ -5340,46 +5389,70 @@
         <p:spPr>
           <a:xfrm>
             <a:off x="0" y="0"/>
-            <a:ext cx="9144000" cy="7010400"/>
+            <a:ext cx="9144000" cy="5257800"/>
           </a:xfrm>
         </p:spPr>
         <p:txBody>
           <a:bodyPr>
-            <a:normAutofit/>
+            <a:noAutofit/>
           </a:bodyPr>
           <a:lstStyle/>
           <a:p>
             <a:r>
-              <a:rPr lang="zh-TW" altLang="en-US" sz="5400" b="1" dirty="0" smtClean="0"/>
-              <a:t>他必救你脫離捕鳥人的網羅</a:t>
-            </a:r>
-            <a:r>
-              <a:rPr lang="zh-TW" altLang="en-US" sz="5400" b="1" dirty="0" smtClean="0"/>
-              <a:t>和</a:t>
-            </a:r>
-            <a:r>
-              <a:rPr lang="zh-CN" altLang="en-US" sz="5400" b="1" dirty="0" smtClean="0"/>
+              <a:rPr lang="zh-TW" altLang="en-US" sz="4800" dirty="0" smtClean="0">
+                <a:latin typeface="Microsoft JhengHei" pitchFamily="34" charset="-120"/>
+                <a:ea typeface="Microsoft JhengHei" pitchFamily="34" charset="-120"/>
+              </a:rPr>
+              <a:t>我</a:t>
+            </a:r>
+            <a:r>
+              <a:rPr lang="zh-TW" altLang="en-US" sz="4800" dirty="0" smtClean="0">
+                <a:latin typeface="Microsoft JhengHei" pitchFamily="34" charset="-120"/>
+                <a:ea typeface="Microsoft JhengHei" pitchFamily="34" charset="-120"/>
+              </a:rPr>
+              <a:t>要論到耶和華說：他是我的避難所，是我的山寨，是我的神，是我所倚靠的</a:t>
+            </a:r>
+            <a:r>
+              <a:rPr lang="zh-TW" altLang="en-US" sz="4800" dirty="0" smtClean="0">
+                <a:latin typeface="Microsoft JhengHei" pitchFamily="34" charset="-120"/>
+                <a:ea typeface="Microsoft JhengHei" pitchFamily="34" charset="-120"/>
+              </a:rPr>
+              <a:t>。</a:t>
+            </a:r>
+            <a:endParaRPr lang="en-US" altLang="zh-TW" sz="4800" dirty="0" smtClean="0">
+              <a:latin typeface="Microsoft JhengHei" pitchFamily="34" charset="-120"/>
+              <a:ea typeface="Microsoft JhengHei" pitchFamily="34" charset="-120"/>
+            </a:endParaRPr>
+          </a:p>
+          <a:p>
+            <a:r>
+              <a:rPr lang="zh-TW" altLang="en-US" sz="4800" b="1" dirty="0">
+                <a:latin typeface="Microsoft JhengHei" pitchFamily="34" charset="-120"/>
+                <a:ea typeface="Microsoft JhengHei" pitchFamily="34" charset="-120"/>
+              </a:rPr>
+              <a:t>他必救你脫離捕鳥人的網羅和</a:t>
+            </a:r>
+            <a:r>
+              <a:rPr lang="zh-CN" altLang="en-US" sz="4800" b="1" dirty="0">
+                <a:latin typeface="Microsoft JhengHei" pitchFamily="34" charset="-120"/>
+                <a:ea typeface="Microsoft JhengHei" pitchFamily="34" charset="-120"/>
+              </a:rPr>
               <a:t>毒</a:t>
             </a:r>
             <a:r>
-              <a:rPr lang="zh-TW" altLang="en-US" sz="5400" b="1" dirty="0" smtClean="0"/>
-              <a:t>害</a:t>
-            </a:r>
-            <a:r>
-              <a:rPr lang="zh-TW" altLang="en-US" sz="5400" b="1" dirty="0" smtClean="0"/>
-              <a:t>的瘟疫。</a:t>
-            </a:r>
-            <a:r>
-              <a:rPr lang="en-US" altLang="zh-TW" sz="5400" b="1" dirty="0" smtClean="0"/>
+              <a:rPr lang="zh-TW" altLang="en-US" sz="4800" b="1" dirty="0">
+                <a:latin typeface="Microsoft JhengHei" pitchFamily="34" charset="-120"/>
+                <a:ea typeface="Microsoft JhengHei" pitchFamily="34" charset="-120"/>
+              </a:rPr>
+              <a:t>害的瘟疫。</a:t>
+            </a:r>
+            <a:r>
+              <a:rPr lang="en-US" altLang="zh-TW" sz="4800" b="1" dirty="0">
+                <a:latin typeface="Microsoft JhengHei" pitchFamily="34" charset="-120"/>
+                <a:ea typeface="Microsoft JhengHei" pitchFamily="34" charset="-120"/>
+              </a:rPr>
               <a:t> </a:t>
             </a:r>
-          </a:p>
-          <a:p>
-            <a:r>
-              <a:rPr lang="zh-TW" altLang="en-US" sz="5400" dirty="0" smtClean="0"/>
-              <a:t>他必用自己的翎毛遮蔽你；你要投靠在他的翅膀底下；他的誠實是大小的盾牌。</a:t>
-            </a:r>
-            <a:endParaRPr lang="en-US" altLang="zh-TW" sz="5400" dirty="0" smtClean="0"/>
           </a:p>
         </p:txBody>
       </p:sp>
@@ -5428,7 +5501,7 @@
         <p:spPr>
           <a:xfrm>
             <a:off x="0" y="0"/>
-            <a:ext cx="9144000" cy="7010400"/>
+            <a:ext cx="9144000" cy="5257800"/>
           </a:xfrm>
         </p:spPr>
         <p:txBody>
@@ -5438,43 +5511,64 @@
           <a:lstStyle/>
           <a:p>
             <a:r>
-              <a:rPr lang="zh-TW" altLang="en-US" sz="5400" b="1" dirty="0" smtClean="0"/>
-              <a:t>你必不怕黑夜的驚駭，或是白日飛的箭，也不怕黑夜行的瘟疫，或是午間滅人</a:t>
-            </a:r>
-            <a:r>
-              <a:rPr lang="zh-TW" altLang="en-US" sz="5400" b="1" dirty="0" smtClean="0"/>
-              <a:t>的</a:t>
-            </a:r>
-            <a:r>
-              <a:rPr lang="zh-CN" altLang="en-US" sz="5400" b="1" dirty="0" smtClean="0"/>
+              <a:rPr lang="zh-TW" altLang="en-US" sz="4800" dirty="0" smtClean="0">
+                <a:latin typeface="Microsoft JhengHei" pitchFamily="34" charset="-120"/>
+                <a:ea typeface="Microsoft JhengHei" pitchFamily="34" charset="-120"/>
+              </a:rPr>
+              <a:t>他</a:t>
+            </a:r>
+            <a:r>
+              <a:rPr lang="zh-TW" altLang="en-US" sz="4800" dirty="0" smtClean="0">
+                <a:latin typeface="Microsoft JhengHei" pitchFamily="34" charset="-120"/>
+                <a:ea typeface="Microsoft JhengHei" pitchFamily="34" charset="-120"/>
+              </a:rPr>
+              <a:t>必用自己的翎毛遮蔽你；你要投靠在他的翅膀底下；他的誠實是大小的盾牌</a:t>
+            </a:r>
+            <a:r>
+              <a:rPr lang="zh-TW" altLang="en-US" sz="4800" dirty="0" smtClean="0">
+                <a:latin typeface="Microsoft JhengHei" pitchFamily="34" charset="-120"/>
+                <a:ea typeface="Microsoft JhengHei" pitchFamily="34" charset="-120"/>
+              </a:rPr>
+              <a:t>。</a:t>
+            </a:r>
+            <a:endParaRPr lang="en-US" altLang="zh-TW" sz="4800" dirty="0" smtClean="0">
+              <a:latin typeface="Microsoft JhengHei" pitchFamily="34" charset="-120"/>
+              <a:ea typeface="Microsoft JhengHei" pitchFamily="34" charset="-120"/>
+            </a:endParaRPr>
+          </a:p>
+          <a:p>
+            <a:r>
+              <a:rPr lang="zh-TW" altLang="en-US" sz="4800" b="1" dirty="0">
+                <a:latin typeface="Microsoft JhengHei" pitchFamily="34" charset="-120"/>
+                <a:ea typeface="Microsoft JhengHei" pitchFamily="34" charset="-120"/>
+              </a:rPr>
+              <a:t>你必不怕黑夜的驚駭，或是白日飛的箭，也不怕黑夜行的瘟疫，或是午間滅人的</a:t>
+            </a:r>
+            <a:r>
+              <a:rPr lang="zh-CN" altLang="en-US" sz="4800" b="1" dirty="0">
+                <a:latin typeface="Microsoft JhengHei" pitchFamily="34" charset="-120"/>
+                <a:ea typeface="Microsoft JhengHei" pitchFamily="34" charset="-120"/>
+              </a:rPr>
               <a:t>毒</a:t>
             </a:r>
             <a:r>
-              <a:rPr lang="zh-TW" altLang="en-US" sz="5400" b="1" dirty="0" smtClean="0"/>
+              <a:rPr lang="zh-TW" altLang="en-US" sz="4800" b="1" dirty="0">
+                <a:latin typeface="Microsoft JhengHei" pitchFamily="34" charset="-120"/>
+                <a:ea typeface="Microsoft JhengHei" pitchFamily="34" charset="-120"/>
+              </a:rPr>
               <a:t>病</a:t>
             </a:r>
             <a:r>
-              <a:rPr lang="zh-TW" altLang="en-US" sz="5400" b="1" dirty="0" smtClean="0"/>
+              <a:rPr lang="zh-TW" altLang="en-US" sz="4800" b="1" dirty="0" smtClean="0">
+                <a:latin typeface="Microsoft JhengHei" pitchFamily="34" charset="-120"/>
+                <a:ea typeface="Microsoft JhengHei" pitchFamily="34" charset="-120"/>
+              </a:rPr>
               <a:t>。</a:t>
             </a:r>
-            <a:endParaRPr lang="en-US" altLang="zh-TW" sz="5400" b="1" dirty="0" smtClean="0"/>
-          </a:p>
-          <a:p>
-            <a:r>
-              <a:rPr lang="zh-TW" altLang="en-US" sz="5400" dirty="0" smtClean="0"/>
-              <a:t>耶和華是我的避難所；你已將至高者當你的居所，</a:t>
-            </a:r>
-            <a:r>
-              <a:rPr lang="en-US" altLang="zh-TW" sz="5400" dirty="0" smtClean="0"/>
-              <a:t> </a:t>
-            </a:r>
-          </a:p>
-          <a:p>
-            <a:r>
-              <a:rPr lang="zh-TW" altLang="en-US" sz="5400" b="1" dirty="0" smtClean="0"/>
-              <a:t>禍患必不臨到你，災害也不挨近你的帳棚。</a:t>
-            </a:r>
-            <a:endParaRPr lang="en-US" altLang="zh-TW" sz="5400" b="1" dirty="0" smtClean="0"/>
+            <a:endParaRPr lang="en-US" altLang="zh-TW" sz="4800" b="1" dirty="0">
+              <a:latin typeface="Microsoft JhengHei" pitchFamily="34" charset="-120"/>
+              <a:ea typeface="Microsoft JhengHei" pitchFamily="34" charset="-120"/>
+            </a:endParaRPr>
           </a:p>
         </p:txBody>
       </p:sp>
@@ -5523,7 +5617,121 @@
         <p:spPr>
           <a:xfrm>
             <a:off x="0" y="0"/>
-            <a:ext cx="9144000" cy="7010400"/>
+            <a:ext cx="9144000" cy="5257800"/>
+          </a:xfrm>
+        </p:spPr>
+        <p:txBody>
+          <a:bodyPr>
+            <a:noAutofit/>
+          </a:bodyPr>
+          <a:lstStyle/>
+          <a:p>
+            <a:r>
+              <a:rPr lang="zh-TW" altLang="en-US" sz="4800" dirty="0" smtClean="0">
+                <a:latin typeface="Microsoft JhengHei" pitchFamily="34" charset="-120"/>
+                <a:ea typeface="Microsoft JhengHei" pitchFamily="34" charset="-120"/>
+              </a:rPr>
+              <a:t>耶</a:t>
+            </a:r>
+            <a:r>
+              <a:rPr lang="zh-TW" altLang="en-US" sz="4800" dirty="0" smtClean="0">
+                <a:latin typeface="Microsoft JhengHei" pitchFamily="34" charset="-120"/>
+                <a:ea typeface="Microsoft JhengHei" pitchFamily="34" charset="-120"/>
+              </a:rPr>
+              <a:t>和華是我的避難所；你已將至高者當你的居所，</a:t>
+            </a:r>
+            <a:r>
+              <a:rPr lang="en-US" altLang="zh-TW" sz="4800" dirty="0" smtClean="0">
+                <a:latin typeface="Microsoft JhengHei" pitchFamily="34" charset="-120"/>
+                <a:ea typeface="Microsoft JhengHei" pitchFamily="34" charset="-120"/>
+              </a:rPr>
+              <a:t> </a:t>
+            </a:r>
+          </a:p>
+          <a:p>
+            <a:r>
+              <a:rPr lang="zh-TW" altLang="en-US" sz="4800" b="1" dirty="0" smtClean="0">
+                <a:latin typeface="Microsoft JhengHei" pitchFamily="34" charset="-120"/>
+                <a:ea typeface="Microsoft JhengHei" pitchFamily="34" charset="-120"/>
+              </a:rPr>
+              <a:t>禍患必不臨到你，災害也不挨近你的帳棚</a:t>
+            </a:r>
+            <a:r>
+              <a:rPr lang="zh-TW" altLang="en-US" sz="4800" b="1" dirty="0" smtClean="0">
+                <a:latin typeface="Microsoft JhengHei" pitchFamily="34" charset="-120"/>
+                <a:ea typeface="Microsoft JhengHei" pitchFamily="34" charset="-120"/>
+              </a:rPr>
+              <a:t>。</a:t>
+            </a:r>
+            <a:endParaRPr lang="en-US" altLang="zh-TW" sz="4800" b="1" dirty="0" smtClean="0">
+              <a:latin typeface="Microsoft JhengHei" pitchFamily="34" charset="-120"/>
+              <a:ea typeface="Microsoft JhengHei" pitchFamily="34" charset="-120"/>
+            </a:endParaRPr>
+          </a:p>
+          <a:p>
+            <a:r>
+              <a:rPr lang="zh-TW" altLang="en-US" sz="4800" dirty="0">
+                <a:latin typeface="Microsoft JhengHei" pitchFamily="34" charset="-120"/>
+                <a:ea typeface="Microsoft JhengHei" pitchFamily="34" charset="-120"/>
+              </a:rPr>
+              <a:t>因他要為你吩咐他的使者，在你行的一切道路上保護你。</a:t>
+            </a:r>
+            <a:r>
+              <a:rPr lang="en-US" altLang="zh-TW" sz="4800" dirty="0">
+                <a:latin typeface="Microsoft JhengHei" pitchFamily="34" charset="-120"/>
+                <a:ea typeface="Microsoft JhengHei" pitchFamily="34" charset="-120"/>
+              </a:rPr>
+              <a:t> </a:t>
+            </a:r>
+          </a:p>
+        </p:txBody>
+      </p:sp>
+    </p:spTree>
+  </p:cSld>
+  <p:clrMapOvr>
+    <a:masterClrMapping/>
+  </p:clrMapOvr>
+  <p:timing>
+    <p:tnLst>
+      <p:par>
+        <p:cTn id="1" dur="indefinite" restart="never" nodeType="tmRoot"/>
+      </p:par>
+    </p:tnLst>
+  </p:timing>
+</p:sld>
+</file>
+
+<file path=ppt/slides/slide7.xml><?xml version="1.0" encoding="utf-8"?>
+<p:sld xmlns:a="http://schemas.openxmlformats.org/drawingml/2006/main" xmlns:r="http://schemas.openxmlformats.org/officeDocument/2006/relationships" xmlns:p="http://schemas.openxmlformats.org/presentationml/2006/main">
+  <p:cSld>
+    <p:spTree>
+      <p:nvGrpSpPr>
+        <p:cNvPr id="1" name=""/>
+        <p:cNvGrpSpPr/>
+        <p:nvPr/>
+      </p:nvGrpSpPr>
+      <p:grpSpPr>
+        <a:xfrm>
+          <a:off x="0" y="0"/>
+          <a:ext cx="0" cy="0"/>
+          <a:chOff x="0" y="0"/>
+          <a:chExt cx="0" cy="0"/>
+        </a:xfrm>
+      </p:grpSpPr>
+      <p:sp>
+        <p:nvSpPr>
+          <p:cNvPr id="3" name="Content Placeholder 2"/>
+          <p:cNvSpPr>
+            <a:spLocks noGrp="1"/>
+          </p:cNvSpPr>
+          <p:nvPr>
+            <p:ph sz="quarter" idx="1"/>
+          </p:nvPr>
+        </p:nvSpPr>
+        <p:spPr>
+          <a:xfrm>
+            <a:off x="0" y="0"/>
+            <a:ext cx="9144000" cy="5257800"/>
           </a:xfrm>
         </p:spPr>
         <p:txBody>
@@ -5533,20 +5741,23 @@
           <a:lstStyle/>
           <a:p>
             <a:r>
-              <a:rPr lang="zh-TW" altLang="en-US" sz="5400" dirty="0" smtClean="0"/>
-              <a:t>因他要為你吩咐他的使者，在你行的一切道路上保護你。</a:t>
-            </a:r>
-            <a:r>
-              <a:rPr lang="en-US" altLang="zh-TW" sz="5400" dirty="0" smtClean="0"/>
-              <a:t> </a:t>
-            </a:r>
-          </a:p>
-          <a:p>
-            <a:r>
-              <a:rPr lang="zh-TW" altLang="en-US" sz="5400" b="1" dirty="0" smtClean="0"/>
-              <a:t>他們要用手托著你，免得你的腳碰在石頭上。</a:t>
-            </a:r>
-            <a:endParaRPr lang="en-US" altLang="zh-TW" sz="5400" b="1" dirty="0" smtClean="0"/>
+              <a:rPr lang="zh-TW" altLang="en-US" sz="4800" b="1" dirty="0" smtClean="0">
+                <a:latin typeface="Microsoft JhengHei" pitchFamily="34" charset="-120"/>
+                <a:ea typeface="Microsoft JhengHei" pitchFamily="34" charset="-120"/>
+              </a:rPr>
+              <a:t>他</a:t>
+            </a:r>
+            <a:r>
+              <a:rPr lang="zh-TW" altLang="en-US" sz="4800" b="1" dirty="0" smtClean="0">
+                <a:latin typeface="Microsoft JhengHei" pitchFamily="34" charset="-120"/>
+                <a:ea typeface="Microsoft JhengHei" pitchFamily="34" charset="-120"/>
+              </a:rPr>
+              <a:t>們要用手托著你，免得你的腳碰在石頭上。</a:t>
+            </a:r>
+            <a:endParaRPr lang="en-US" altLang="zh-TW" sz="4800" b="1" dirty="0" smtClean="0">
+              <a:latin typeface="Microsoft JhengHei" pitchFamily="34" charset="-120"/>
+              <a:ea typeface="Microsoft JhengHei" pitchFamily="34" charset="-120"/>
+            </a:endParaRPr>
           </a:p>
         </p:txBody>
       </p:sp>

</xml_diff>